<commit_message>
Inserção de comentários na apresentação
</commit_message>
<xml_diff>
--- a/Apresentação/Apresentação - v00.01.pptx
+++ b/Apresentação/Apresentação - v00.01.pptx
@@ -245,7 +245,7 @@
             <a:fld id="{00B2452C-69D8-483C-BB39-1A254D2FB397}" type="datetimeFigureOut">
               <a:rPr lang="pt-BR" smtClean="0"/>
               <a:pPr/>
-              <a:t>02/10/2016</a:t>
+              <a:t>03/10/2016</a:t>
             </a:fld>
             <a:endParaRPr lang="pt-BR" dirty="0"/>
           </a:p>
@@ -412,7 +412,7 @@
             <a:fld id="{E2787CA8-F5E9-4B7B-A225-2BC30D4709F8}" type="datetimeFigureOut">
               <a:rPr lang="pt-BR" smtClean="0"/>
               <a:pPr/>
-              <a:t>02/10/2016</a:t>
+              <a:t>03/10/2016</a:t>
             </a:fld>
             <a:endParaRPr lang="pt-BR" dirty="0"/>
           </a:p>
@@ -679,6 +679,279 @@
     </a:lvl9pPr>
   </p:notesStyle>
 </p:notesMaster>
+</file>
+
+<file path=ppt/notesSlides/notesSlide1.xml><?xml version="1.0" encoding="utf-8"?>
+<p:notes xmlns:a="http://schemas.openxmlformats.org/drawingml/2006/main" xmlns:r="http://schemas.openxmlformats.org/officeDocument/2006/relationships" xmlns:p="http://schemas.openxmlformats.org/presentationml/2006/main">
+  <p:cSld>
+    <p:spTree>
+      <p:nvGrpSpPr>
+        <p:cNvPr id="1" name=""/>
+        <p:cNvGrpSpPr/>
+        <p:nvPr/>
+      </p:nvGrpSpPr>
+      <p:grpSpPr>
+        <a:xfrm>
+          <a:off x="0" y="0"/>
+          <a:ext cx="0" cy="0"/>
+          <a:chOff x="0" y="0"/>
+          <a:chExt cx="0" cy="0"/>
+        </a:xfrm>
+      </p:grpSpPr>
+      <p:sp>
+        <p:nvSpPr>
+          <p:cNvPr id="2" name="Espaço Reservado para Imagem de Slide 1"/>
+          <p:cNvSpPr>
+            <a:spLocks noGrp="1" noRot="1" noChangeAspect="1"/>
+          </p:cNvSpPr>
+          <p:nvPr>
+            <p:ph type="sldImg"/>
+          </p:nvPr>
+        </p:nvSpPr>
+        <p:spPr/>
+      </p:sp>
+      <p:sp>
+        <p:nvSpPr>
+          <p:cNvPr id="3" name="Espaço Reservado para Anotações 2"/>
+          <p:cNvSpPr>
+            <a:spLocks noGrp="1"/>
+          </p:cNvSpPr>
+          <p:nvPr>
+            <p:ph type="body" idx="1"/>
+          </p:nvPr>
+        </p:nvSpPr>
+        <p:spPr/>
+        <p:txBody>
+          <a:bodyPr/>
+          <a:lstStyle/>
+          <a:p>
+            <a:r>
+              <a:rPr lang="pt-BR" dirty="0" smtClean="0"/>
+              <a:t>-&gt; </a:t>
+            </a:r>
+            <a:r>
+              <a:rPr lang="pt-BR" b="1" dirty="0" smtClean="0"/>
+              <a:t>Wall Street</a:t>
+            </a:r>
+          </a:p>
+          <a:p>
+            <a:r>
+              <a:rPr lang="pt-BR" sz="1200" i="0" kern="1200" dirty="0" smtClean="0">
+                <a:solidFill>
+                  <a:schemeClr val="tx1"/>
+                </a:solidFill>
+                <a:effectLst/>
+                <a:latin typeface="+mn-lt"/>
+                <a:ea typeface="+mn-ea"/>
+                <a:cs typeface="+mn-cs"/>
+              </a:rPr>
+              <a:t>Wall Street tem esse nome por causa de um muro (</a:t>
+            </a:r>
+            <a:r>
+              <a:rPr lang="pt-BR" sz="1200" i="0" kern="1200" dirty="0" err="1" smtClean="0">
+                <a:solidFill>
+                  <a:schemeClr val="tx1"/>
+                </a:solidFill>
+                <a:effectLst/>
+                <a:latin typeface="+mn-lt"/>
+                <a:ea typeface="+mn-ea"/>
+                <a:cs typeface="+mn-cs"/>
+              </a:rPr>
+              <a:t>wall</a:t>
+            </a:r>
+            <a:r>
+              <a:rPr lang="pt-BR" sz="1200" i="0" kern="1200" dirty="0" smtClean="0">
+                <a:solidFill>
+                  <a:schemeClr val="tx1"/>
+                </a:solidFill>
+                <a:effectLst/>
+                <a:latin typeface="+mn-lt"/>
+                <a:ea typeface="+mn-ea"/>
+                <a:cs typeface="+mn-cs"/>
+              </a:rPr>
+              <a:t>) que impedia os animais domésticos de se afastarem demais do assentamento existente na ponta de Manhattan.</a:t>
+            </a:r>
+          </a:p>
+          <a:p>
+            <a:r>
+              <a:rPr lang="pt-BR" sz="1200" i="0" kern="1200" baseline="0" dirty="0" smtClean="0">
+                <a:solidFill>
+                  <a:schemeClr val="tx1"/>
+                </a:solidFill>
+                <a:effectLst/>
+                <a:latin typeface="+mn-lt"/>
+                <a:ea typeface="+mn-ea"/>
+                <a:cs typeface="+mn-cs"/>
+              </a:rPr>
+              <a:t>  </a:t>
+            </a:r>
+            <a:r>
+              <a:rPr lang="pt-BR" dirty="0" smtClean="0"/>
+              <a:t>-&gt; </a:t>
+            </a:r>
+            <a:r>
+              <a:rPr lang="pt-BR" b="1" dirty="0" smtClean="0"/>
+              <a:t>Lobos</a:t>
+            </a:r>
+          </a:p>
+          <a:p>
+            <a:r>
+              <a:rPr lang="pt-BR" b="1" baseline="0" dirty="0" smtClean="0"/>
+              <a:t>  </a:t>
+            </a:r>
+            <a:r>
+              <a:rPr lang="pt-BR" baseline="0" dirty="0" smtClean="0"/>
+              <a:t>São os vendedores. São os operadores que apostam na baixa dos preços para lucrar.</a:t>
+            </a:r>
+          </a:p>
+          <a:p>
+            <a:r>
+              <a:rPr lang="pt-BR" baseline="0" dirty="0" smtClean="0"/>
+              <a:t>  </a:t>
+            </a:r>
+            <a:r>
+              <a:rPr lang="pt-BR" dirty="0" smtClean="0"/>
+              <a:t>-&gt;</a:t>
+            </a:r>
+            <a:r>
+              <a:rPr lang="pt-BR" baseline="0" dirty="0" smtClean="0"/>
+              <a:t> </a:t>
+            </a:r>
+            <a:r>
+              <a:rPr lang="pt-BR" b="1" baseline="0" dirty="0" smtClean="0"/>
+              <a:t>Ursos</a:t>
+            </a:r>
+          </a:p>
+          <a:p>
+            <a:r>
+              <a:rPr lang="pt-BR" b="1" baseline="0" dirty="0" smtClean="0"/>
+              <a:t>  </a:t>
+            </a:r>
+            <a:r>
+              <a:rPr lang="pt-BR" baseline="0" dirty="0" smtClean="0"/>
+              <a:t>São os compradores. </a:t>
+            </a:r>
+            <a:r>
+              <a:rPr lang="pt-BR" baseline="0" dirty="0" smtClean="0"/>
+              <a:t>São os operadores que apostam na alta dos preços para lucrar.</a:t>
+            </a:r>
+          </a:p>
+          <a:p>
+            <a:r>
+              <a:rPr lang="pt-BR" baseline="0" dirty="0" smtClean="0"/>
+              <a:t>  -&gt; </a:t>
+            </a:r>
+            <a:r>
+              <a:rPr lang="pt-BR" b="1" baseline="0" dirty="0" smtClean="0"/>
+              <a:t>Porcos</a:t>
+            </a:r>
+          </a:p>
+          <a:p>
+            <a:r>
+              <a:rPr lang="pt-BR" b="1" baseline="0" dirty="0" smtClean="0"/>
+              <a:t>  </a:t>
+            </a:r>
+            <a:r>
+              <a:rPr lang="pt-BR" dirty="0" smtClean="0"/>
+              <a:t>São os operadores gulosos. Sempre</a:t>
+            </a:r>
+            <a:r>
+              <a:rPr lang="pt-BR" baseline="0" dirty="0" smtClean="0"/>
+              <a:t> acabam abatidos para satisfazer a próprio intemperança.</a:t>
+            </a:r>
+          </a:p>
+          <a:p>
+            <a:r>
+              <a:rPr lang="pt-BR" baseline="0" dirty="0" smtClean="0"/>
+              <a:t>  -&gt; </a:t>
+            </a:r>
+            <a:r>
+              <a:rPr lang="pt-BR" b="1" baseline="0" dirty="0" smtClean="0"/>
+              <a:t>Carneiros</a:t>
+            </a:r>
+          </a:p>
+          <a:p>
+            <a:r>
+              <a:rPr lang="pt-BR" b="1" baseline="0" dirty="0" smtClean="0"/>
+              <a:t>  </a:t>
+            </a:r>
+            <a:r>
+              <a:rPr lang="pt-BR" b="0" baseline="0" dirty="0" smtClean="0"/>
+              <a:t>São os operadores que mantém suas posições por muito tempo. São seguidores passivos e medrosos de tendências, de dicas e de gurus.</a:t>
+            </a:r>
+          </a:p>
+          <a:p>
+            <a:r>
+              <a:rPr lang="pt-BR" b="0" baseline="0" dirty="0" smtClean="0"/>
+              <a:t>-------</a:t>
+            </a:r>
+          </a:p>
+          <a:p>
+            <a:r>
+              <a:rPr lang="pt-BR" b="0" baseline="0" dirty="0" smtClean="0"/>
+              <a:t>-&gt; Análise Técnica</a:t>
+            </a:r>
+          </a:p>
+          <a:p>
+            <a:r>
+              <a:rPr lang="pt-BR" b="0" dirty="0" smtClean="0"/>
+              <a:t>A análise técnica é psicologia social aplicada. Seu objetivo é identificar tendências e mudanças no comportamento das multidões, a fim de tomar decisões inteligentes sobre as operações no mercado.</a:t>
+            </a:r>
+          </a:p>
+          <a:p>
+            <a:r>
+              <a:rPr lang="pt-BR" b="0" dirty="0" smtClean="0"/>
+              <a:t>-&gt; </a:t>
+            </a:r>
+            <a:r>
+              <a:rPr lang="pt-BR" b="0" smtClean="0"/>
+              <a:t>Anális</a:t>
+            </a:r>
+            <a:r>
+              <a:rPr lang="pt-BR" b="0" baseline="0" smtClean="0"/>
+              <a:t>e Fundamentalista</a:t>
+            </a:r>
+          </a:p>
+          <a:p>
+            <a:endParaRPr lang="pt-BR" b="0" dirty="0"/>
+          </a:p>
+        </p:txBody>
+      </p:sp>
+      <p:sp>
+        <p:nvSpPr>
+          <p:cNvPr id="4" name="Espaço Reservado para Número de Slide 3"/>
+          <p:cNvSpPr>
+            <a:spLocks noGrp="1"/>
+          </p:cNvSpPr>
+          <p:nvPr>
+            <p:ph type="sldNum" sz="quarter" idx="10"/>
+          </p:nvPr>
+        </p:nvSpPr>
+        <p:spPr/>
+        <p:txBody>
+          <a:bodyPr/>
+          <a:lstStyle/>
+          <a:p>
+            <a:fld id="{2B5E1511-57C9-4010-B804-AF160D10F624}" type="slidenum">
+              <a:rPr lang="pt-BR" smtClean="0"/>
+              <a:pPr/>
+              <a:t>5</a:t>
+            </a:fld>
+            <a:endParaRPr lang="pt-BR" dirty="0"/>
+          </a:p>
+        </p:txBody>
+      </p:sp>
+    </p:spTree>
+    <p:extLst>
+      <p:ext uri="{BB962C8B-B14F-4D97-AF65-F5344CB8AC3E}">
+        <p14:creationId xmlns:p14="http://schemas.microsoft.com/office/powerpoint/2010/main" val="3174089483"/>
+      </p:ext>
+    </p:extLst>
+  </p:cSld>
+  <p:clrMapOvr>
+    <a:masterClrMapping/>
+  </p:clrMapOvr>
+</p:notes>
 </file>
 
 <file path=ppt/slideLayouts/slideLayout1.xml><?xml version="1.0" encoding="utf-8"?>
@@ -2233,11 +2506,7 @@
             <a:pPr lvl="1"/>
             <a:r>
               <a:rPr lang="en-US" dirty="0"/>
-              <a:t>Bayesian Methods and Neural </a:t>
-            </a:r>
-            <a:r>
-              <a:rPr lang="en-US" dirty="0"/>
-              <a:t>Networks (David </a:t>
+              <a:t>Bayesian Methods and Neural Networks (David </a:t>
             </a:r>
             <a:r>
               <a:rPr lang="en-US" dirty="0" smtClean="0"/>
@@ -2662,11 +2931,7 @@
           <a:p>
             <a:r>
               <a:rPr lang="pt-BR" dirty="0" smtClean="0"/>
-              <a:t>Cenário – Mercado </a:t>
-            </a:r>
-            <a:r>
-              <a:rPr lang="pt-BR" dirty="0" smtClean="0"/>
-              <a:t>de Ações</a:t>
+              <a:t>Cenário – Mercado de Ações</a:t>
             </a:r>
           </a:p>
           <a:p>
@@ -2686,11 +2951,7 @@
           <a:p>
             <a:r>
               <a:rPr lang="pt-BR" dirty="0" smtClean="0"/>
-              <a:t>Escopo do </a:t>
-            </a:r>
-            <a:r>
-              <a:rPr lang="pt-BR" dirty="0" smtClean="0"/>
-              <a:t>Estudo</a:t>
+              <a:t>Escopo do Estudo</a:t>
             </a:r>
           </a:p>
           <a:p>
@@ -2708,7 +2969,6 @@
               <a:rPr lang="pt-BR" dirty="0" smtClean="0"/>
               <a:t>Arquitetura</a:t>
             </a:r>
-            <a:endParaRPr lang="pt-BR" dirty="0" smtClean="0"/>
           </a:p>
           <a:p>
             <a:r>
@@ -2727,7 +2987,6 @@
               <a:rPr lang="pt-BR" dirty="0" smtClean="0"/>
               <a:t>Referências</a:t>
             </a:r>
-            <a:endParaRPr lang="pt-BR" dirty="0" smtClean="0"/>
           </a:p>
         </p:txBody>
       </p:sp>
@@ -2785,11 +3044,7 @@
           <a:p>
             <a:r>
               <a:rPr lang="pt-BR" dirty="0" smtClean="0"/>
-              <a:t>Cenário – Mercado </a:t>
-            </a:r>
-            <a:r>
-              <a:rPr lang="pt-BR" dirty="0" smtClean="0"/>
-              <a:t>de Ações</a:t>
+              <a:t>Cenário – Mercado de Ações</a:t>
             </a:r>
             <a:endParaRPr lang="pt-BR" dirty="0"/>
           </a:p>
@@ -2901,8 +3156,17 @@
           <a:p>
             <a:r>
               <a:rPr lang="pt-BR" dirty="0" smtClean="0"/>
-              <a:t>Diariamente, milhares de transações financeiras são efetuadas;</a:t>
-            </a:r>
+              <a:t>Diariamente </a:t>
+            </a:r>
+            <a:r>
+              <a:rPr lang="pt-BR" dirty="0" smtClean="0"/>
+              <a:t>milhares de transações financeiras são </a:t>
+            </a:r>
+            <a:r>
+              <a:rPr lang="pt-BR" dirty="0" smtClean="0"/>
+              <a:t>efetuadas.</a:t>
+            </a:r>
+            <a:endParaRPr lang="pt-BR" dirty="0" smtClean="0"/>
           </a:p>
           <a:p>
             <a:r>
@@ -2974,7 +3238,7 @@
           <p:nvPr>
             <p:extLst>
               <p:ext uri="{D42A27DB-BD31-4B8C-83A1-F6EECF244321}">
-                <p14:modId xmlns:p14="http://schemas.microsoft.com/office/powerpoint/2010/main" val="2668310846"/>
+                <p14:modId xmlns:p14="http://schemas.microsoft.com/office/powerpoint/2010/main" val="2172713191"/>
               </p:ext>
             </p:extLst>
           </p:nvPr>
@@ -3017,11 +3281,7 @@
                       <a:pPr algn="ctr"/>
                       <a:r>
                         <a:rPr lang="pt-BR" dirty="0" smtClean="0"/>
-                        <a:t>Transações </a:t>
-                      </a:r>
-                      <a:r>
-                        <a:rPr lang="pt-BR" dirty="0" smtClean="0"/>
-                        <a:t>Diárias [2]</a:t>
+                        <a:t>Transações Diárias [2]</a:t>
                       </a:r>
                       <a:endParaRPr lang="pt-BR" dirty="0"/>
                     </a:p>
@@ -3053,7 +3313,7 @@
                       <a:pPr algn="ctr"/>
                       <a:r>
                         <a:rPr lang="pt-BR" dirty="0" smtClean="0"/>
-                        <a:t>2.946.646</a:t>
+                        <a:t>2.9B</a:t>
                       </a:r>
                       <a:endParaRPr lang="pt-BR" dirty="0"/>
                     </a:p>
@@ -3085,7 +3345,7 @@
                       <a:pPr algn="ctr"/>
                       <a:r>
                         <a:rPr lang="pt-BR" dirty="0" smtClean="0"/>
-                        <a:t>135.473.871</a:t>
+                        <a:t>135B</a:t>
                       </a:r>
                       <a:endParaRPr lang="pt-BR" dirty="0"/>
                     </a:p>
@@ -3117,7 +3377,7 @@
                       <a:pPr algn="ctr"/>
                       <a:r>
                         <a:rPr lang="pt-BR" dirty="0" smtClean="0"/>
-                        <a:t>555.288.072</a:t>
+                        <a:t>555B</a:t>
                       </a:r>
                       <a:endParaRPr lang="pt-BR" dirty="0"/>
                     </a:p>
@@ -3149,7 +3409,7 @@
                       <a:pPr algn="ctr"/>
                       <a:r>
                         <a:rPr lang="pt-BR" dirty="0" smtClean="0"/>
-                        <a:t>124.370</a:t>
+                        <a:t>124M</a:t>
                       </a:r>
                       <a:endParaRPr lang="pt-BR" dirty="0"/>
                     </a:p>
@@ -3215,11 +3475,7 @@
           <a:p>
             <a:r>
               <a:rPr lang="pt-BR" dirty="0" smtClean="0"/>
-              <a:t>Cenário – Conceitos </a:t>
-            </a:r>
-            <a:r>
-              <a:rPr lang="pt-BR" dirty="0" smtClean="0"/>
-              <a:t>Importantes</a:t>
+              <a:t>Cenário – Conceitos Importantes</a:t>
             </a:r>
             <a:endParaRPr lang="pt-BR" dirty="0"/>
           </a:p>
@@ -3374,11 +3630,7 @@
           <a:p>
             <a:r>
               <a:rPr lang="pt-BR" dirty="0" smtClean="0"/>
-              <a:t>Cenário – Conceitos </a:t>
-            </a:r>
-            <a:r>
-              <a:rPr lang="pt-BR" dirty="0" smtClean="0"/>
-              <a:t>Importantes</a:t>
+              <a:t>Cenário – Conceitos Importantes</a:t>
             </a:r>
             <a:endParaRPr lang="pt-BR" dirty="0"/>
           </a:p>
@@ -3479,7 +3731,6 @@
               <a:rPr lang="pt-BR" dirty="0" smtClean="0"/>
               <a:t>Vendido</a:t>
             </a:r>
-            <a:endParaRPr lang="pt-BR" dirty="0" smtClean="0"/>
           </a:p>
           <a:p>
             <a:endParaRPr lang="pt-BR" dirty="0" smtClean="0"/>

</xml_diff>